<commit_message>
added doku and poster
</commit_message>
<xml_diff>
--- a/projectwork/Plakat.pptx
+++ b/projectwork/Plakat.pptx
@@ -3391,14 +3391,14 @@
           </a:ln>
           <a:extLst>
             <a:ext uri="{909E8E84-426E-40dd-AFC4-6F175D3DCCD1}">
-              <a14:hiddenFill xmlns:a14="http://schemas.microsoft.com/office/drawing/2010/main" xmlns="">
+              <a14:hiddenFill xmlns="" xmlns:a14="http://schemas.microsoft.com/office/drawing/2010/main">
                 <a:solidFill>
                   <a:srgbClr val="FFFFFF"/>
                 </a:solidFill>
               </a14:hiddenFill>
             </a:ext>
             <a:ext uri="{91240B29-F687-4f45-9708-019B960494DF}">
-              <a14:hiddenLine xmlns:a14="http://schemas.microsoft.com/office/drawing/2010/main" xmlns="" w="9525">
+              <a14:hiddenLine xmlns="" xmlns:a14="http://schemas.microsoft.com/office/drawing/2010/main" w="9525">
                 <a:solidFill>
                   <a:srgbClr val="000000"/>
                 </a:solidFill>
@@ -4257,7 +4257,7 @@
         </p:blipFill>
         <p:spPr>
           <a:xfrm>
-            <a:off x="1801828" y="3230373"/>
+            <a:off x="1816027" y="3230373"/>
             <a:ext cx="691221" cy="691221"/>
           </a:xfrm>
           <a:prstGeom prst="rect">

</xml_diff>